<commit_message>
finished making the power point, going to make a couple extra notes to help with the presentation
</commit_message>
<xml_diff>
--- a/ProposalSlides.pptx
+++ b/ProposalSlides.pptx
@@ -3890,6 +3890,16 @@
             </a:r>
           </a:p>
           <a:p>
+            <a:r>
+              <a:rPr lang="en-US" dirty="0" smtClean="0"/>
+              <a:t>Computer Science </a:t>
+            </a:r>
+          </a:p>
+          <a:p>
+            <a:r>
+              <a:rPr lang="en-US" dirty="0" smtClean="0"/>
+              <a:t>2XB3 L01</a:t>
+            </a:r>
             <a:endParaRPr lang="en-US" dirty="0"/>
           </a:p>
         </p:txBody>
@@ -4157,12 +4167,65 @@
             <p:ph idx="1"/>
           </p:nvPr>
         </p:nvSpPr>
-        <p:spPr/>
-        <p:txBody>
-          <a:bodyPr/>
-          <a:lstStyle/>
-          <a:p>
-            <a:endParaRPr lang="en-US"/>
+        <p:spPr>
+          <a:xfrm>
+            <a:off x="685800" y="1698002"/>
+            <a:ext cx="7770813" cy="4694475"/>
+          </a:xfrm>
+        </p:spPr>
+        <p:txBody>
+          <a:bodyPr>
+            <a:normAutofit/>
+          </a:bodyPr>
+          <a:lstStyle/>
+          <a:p>
+            <a:r>
+              <a:rPr lang="en-US" dirty="0" smtClean="0"/>
+              <a:t> </a:t>
+            </a:r>
+            <a:r>
+              <a:rPr lang="en-US" dirty="0"/>
+              <a:t>Input</a:t>
+            </a:r>
+            <a:r>
+              <a:rPr lang="en-US" dirty="0" smtClean="0"/>
+              <a:t>:</a:t>
+            </a:r>
+          </a:p>
+          <a:p>
+            <a:pPr lvl="1"/>
+            <a:r>
+              <a:rPr lang="en-US" dirty="0" smtClean="0"/>
+              <a:t>Take large sets of information from government websites</a:t>
+            </a:r>
+          </a:p>
+          <a:p>
+            <a:pPr lvl="1"/>
+            <a:r>
+              <a:rPr lang="en-US" dirty="0" smtClean="0"/>
+              <a:t>Example: Lets say we gave the program vehicle accident rate</a:t>
+            </a:r>
+          </a:p>
+          <a:p>
+            <a:r>
+              <a:rPr lang="en-US" dirty="0" smtClean="0"/>
+              <a:t>Output </a:t>
+            </a:r>
+          </a:p>
+          <a:p>
+            <a:pPr lvl="1"/>
+            <a:r>
+              <a:rPr lang="en-US" dirty="0" smtClean="0"/>
+              <a:t>Correlations from the topic to the different variables</a:t>
+            </a:r>
+          </a:p>
+          <a:p>
+            <a:pPr lvl="1"/>
+            <a:r>
+              <a:rPr lang="en-US" dirty="0" smtClean="0"/>
+              <a:t>Example: correlate the vehicle accident rate with all the respective variables such as age, gender, and return the one with the highest correlation</a:t>
+            </a:r>
+            <a:endParaRPr lang="en-US" dirty="0" smtClean="0"/>
           </a:p>
         </p:txBody>
       </p:sp>
@@ -4234,7 +4297,60 @@
           <a:bodyPr/>
           <a:lstStyle/>
           <a:p>
-            <a:endParaRPr lang="en-US"/>
+            <a:r>
+              <a:rPr lang="en-US" dirty="0" smtClean="0"/>
+              <a:t>Store information categories in BST to search</a:t>
+            </a:r>
+            <a:endParaRPr lang="en-US" dirty="0" smtClean="0"/>
+          </a:p>
+          <a:p>
+            <a:endParaRPr lang="en-US" dirty="0"/>
+          </a:p>
+          <a:p>
+            <a:r>
+              <a:rPr lang="en-US" dirty="0" smtClean="0"/>
+              <a:t>Algorithms to effectively find correlation between variables using </a:t>
+            </a:r>
+            <a:r>
+              <a:rPr lang="en-US" dirty="0" smtClean="0"/>
+              <a:t>a </a:t>
+            </a:r>
+            <a:r>
+              <a:rPr lang="en-US" dirty="0" smtClean="0"/>
+              <a:t>graphing algorithm</a:t>
+            </a:r>
+          </a:p>
+          <a:p>
+            <a:endParaRPr lang="en-US" dirty="0"/>
+          </a:p>
+          <a:p>
+            <a:r>
+              <a:rPr lang="en-US" dirty="0" smtClean="0"/>
+              <a:t>Reformatting the data would use a </a:t>
+            </a:r>
+            <a:r>
+              <a:rPr lang="en-US" smtClean="0"/>
+              <a:t>hashmap</a:t>
+            </a:r>
+            <a:endParaRPr lang="en-US" dirty="0" smtClean="0"/>
+          </a:p>
+          <a:p>
+            <a:endParaRPr lang="en-US" dirty="0"/>
+          </a:p>
+          <a:p>
+            <a:endParaRPr lang="en-US" dirty="0" smtClean="0"/>
+          </a:p>
+          <a:p>
+            <a:endParaRPr lang="en-US" dirty="0"/>
+          </a:p>
+          <a:p>
+            <a:endParaRPr lang="en-US" dirty="0" smtClean="0"/>
+          </a:p>
+          <a:p>
+            <a:endParaRPr lang="en-US" dirty="0"/>
+          </a:p>
+          <a:p>
+            <a:endParaRPr lang="en-US" dirty="0"/>
           </a:p>
         </p:txBody>
       </p:sp>
@@ -4283,26 +4399,59 @@
           <a:bodyPr/>
           <a:lstStyle/>
           <a:p>
-            <a:endParaRPr lang="en-US"/>
-          </a:p>
-        </p:txBody>
-      </p:sp>
-      <p:sp>
-        <p:nvSpPr>
-          <p:cNvPr id="3" name="Content Placeholder 2"/>
-          <p:cNvSpPr>
-            <a:spLocks noGrp="1"/>
-          </p:cNvSpPr>
-          <p:nvPr>
-            <p:ph idx="1"/>
-          </p:nvPr>
-        </p:nvSpPr>
-        <p:spPr/>
-        <p:txBody>
-          <a:bodyPr/>
-          <a:lstStyle/>
-          <a:p>
-            <a:endParaRPr lang="en-US"/>
+            <a:r>
+              <a:rPr lang="en-US" dirty="0" smtClean="0"/>
+              <a:t>FINISHED</a:t>
+            </a:r>
+            <a:endParaRPr lang="en-US" dirty="0"/>
+          </a:p>
+        </p:txBody>
+      </p:sp>
+      <p:sp>
+        <p:nvSpPr>
+          <p:cNvPr id="4" name="Text Placeholder 3"/>
+          <p:cNvSpPr>
+            <a:spLocks noGrp="1"/>
+          </p:cNvSpPr>
+          <p:nvPr>
+            <p:ph type="body" idx="1"/>
+          </p:nvPr>
+        </p:nvSpPr>
+        <p:spPr/>
+        <p:txBody>
+          <a:bodyPr/>
+          <a:lstStyle/>
+          <a:p>
+            <a:r>
+              <a:rPr lang="en-US" dirty="0" smtClean="0"/>
+              <a:t>Ahmed </a:t>
+            </a:r>
+            <a:r>
+              <a:rPr lang="en-US" dirty="0" err="1" smtClean="0"/>
+              <a:t>Arif</a:t>
+            </a:r>
+            <a:r>
+              <a:rPr lang="en-US" dirty="0" smtClean="0"/>
+              <a:t> Khan</a:t>
+            </a:r>
+          </a:p>
+          <a:p>
+            <a:r>
+              <a:rPr lang="en-US" dirty="0" smtClean="0"/>
+              <a:t>1324501</a:t>
+            </a:r>
+          </a:p>
+          <a:p>
+            <a:r>
+              <a:rPr lang="en-US" dirty="0" smtClean="0"/>
+              <a:t>Computer Science</a:t>
+            </a:r>
+          </a:p>
+          <a:p>
+            <a:r>
+              <a:rPr lang="en-US" dirty="0" smtClean="0"/>
+              <a:t>2XB3 L01</a:t>
+            </a:r>
           </a:p>
         </p:txBody>
       </p:sp>

</xml_diff>